<commit_message>
Cambio Nombres Test Doubles en el pom.xml
</commit_message>
<xml_diff>
--- a/Diapositivas/6. Legacy Code.pptx
+++ b/Diapositivas/6. Legacy Code.pptx
@@ -12,8 +12,8 @@
     <p:sldId id="629" r:id="rId3"/>
     <p:sldId id="632" r:id="rId4"/>
     <p:sldId id="633" r:id="rId5"/>
-    <p:sldId id="698" r:id="rId6"/>
-    <p:sldId id="699" r:id="rId7"/>
+    <p:sldId id="699" r:id="rId6"/>
+    <p:sldId id="698" r:id="rId7"/>
     <p:sldId id="686" r:id="rId8"/>
     <p:sldId id="687" r:id="rId9"/>
     <p:sldId id="688" r:id="rId10"/>
@@ -218,7 +218,7 @@
           <a:p>
             <a:fld id="{63D5FC4C-9EE1-4746-A368-724F618FC790}" type="datetimeFigureOut">
               <a:rPr lang="es-PE" smtClean="0"/>
-              <a:t>26/11/2013</a:t>
+              <a:t>11/12/2013</a:t>
             </a:fld>
             <a:endParaRPr lang="es-PE"/>
           </a:p>
@@ -2387,7 +2387,7 @@
             <a:fld id="{807CB568-C05F-482F-9F26-AA302B8892DF}" type="datetimeFigureOut">
               <a:rPr lang="es-ES" smtClean="0"/>
               <a:pPr/>
-              <a:t>26/11/2013</a:t>
+              <a:t>11/12/2013</a:t>
             </a:fld>
             <a:endParaRPr lang="es-ES"/>
           </a:p>
@@ -2566,7 +2566,7 @@
             <a:fld id="{807CB568-C05F-482F-9F26-AA302B8892DF}" type="datetimeFigureOut">
               <a:rPr lang="es-ES" smtClean="0"/>
               <a:pPr/>
-              <a:t>26/11/2013</a:t>
+              <a:t>11/12/2013</a:t>
             </a:fld>
             <a:endParaRPr lang="es-ES"/>
           </a:p>
@@ -2755,7 +2755,7 @@
             <a:fld id="{807CB568-C05F-482F-9F26-AA302B8892DF}" type="datetimeFigureOut">
               <a:rPr lang="es-ES" smtClean="0"/>
               <a:pPr/>
-              <a:t>26/11/2013</a:t>
+              <a:t>11/12/2013</a:t>
             </a:fld>
             <a:endParaRPr lang="es-ES"/>
           </a:p>
@@ -2934,7 +2934,7 @@
             <a:fld id="{807CB568-C05F-482F-9F26-AA302B8892DF}" type="datetimeFigureOut">
               <a:rPr lang="es-ES" smtClean="0"/>
               <a:pPr/>
-              <a:t>26/11/2013</a:t>
+              <a:t>11/12/2013</a:t>
             </a:fld>
             <a:endParaRPr lang="es-ES"/>
           </a:p>
@@ -3189,7 +3189,7 @@
             <a:fld id="{807CB568-C05F-482F-9F26-AA302B8892DF}" type="datetimeFigureOut">
               <a:rPr lang="es-ES" smtClean="0"/>
               <a:pPr/>
-              <a:t>26/11/2013</a:t>
+              <a:t>11/12/2013</a:t>
             </a:fld>
             <a:endParaRPr lang="es-ES"/>
           </a:p>
@@ -3486,7 +3486,7 @@
             <a:fld id="{807CB568-C05F-482F-9F26-AA302B8892DF}" type="datetimeFigureOut">
               <a:rPr lang="es-ES" smtClean="0"/>
               <a:pPr/>
-              <a:t>26/11/2013</a:t>
+              <a:t>11/12/2013</a:t>
             </a:fld>
             <a:endParaRPr lang="es-ES"/>
           </a:p>
@@ -3917,7 +3917,7 @@
             <a:fld id="{807CB568-C05F-482F-9F26-AA302B8892DF}" type="datetimeFigureOut">
               <a:rPr lang="es-ES" smtClean="0"/>
               <a:pPr/>
-              <a:t>26/11/2013</a:t>
+              <a:t>11/12/2013</a:t>
             </a:fld>
             <a:endParaRPr lang="es-ES"/>
           </a:p>
@@ -4044,7 +4044,7 @@
             <a:fld id="{807CB568-C05F-482F-9F26-AA302B8892DF}" type="datetimeFigureOut">
               <a:rPr lang="es-ES" smtClean="0"/>
               <a:pPr/>
-              <a:t>26/11/2013</a:t>
+              <a:t>11/12/2013</a:t>
             </a:fld>
             <a:endParaRPr lang="es-ES"/>
           </a:p>
@@ -4148,7 +4148,7 @@
             <a:fld id="{807CB568-C05F-482F-9F26-AA302B8892DF}" type="datetimeFigureOut">
               <a:rPr lang="es-ES" smtClean="0"/>
               <a:pPr/>
-              <a:t>26/11/2013</a:t>
+              <a:t>11/12/2013</a:t>
             </a:fld>
             <a:endParaRPr lang="es-ES"/>
           </a:p>
@@ -4434,7 +4434,7 @@
             <a:fld id="{807CB568-C05F-482F-9F26-AA302B8892DF}" type="datetimeFigureOut">
               <a:rPr lang="es-ES" smtClean="0"/>
               <a:pPr/>
-              <a:t>26/11/2013</a:t>
+              <a:t>11/12/2013</a:t>
             </a:fld>
             <a:endParaRPr lang="es-ES"/>
           </a:p>
@@ -4703,7 +4703,7 @@
             <a:fld id="{807CB568-C05F-482F-9F26-AA302B8892DF}" type="datetimeFigureOut">
               <a:rPr lang="es-ES" smtClean="0"/>
               <a:pPr/>
-              <a:t>26/11/2013</a:t>
+              <a:t>11/12/2013</a:t>
             </a:fld>
             <a:endParaRPr lang="es-ES"/>
           </a:p>
@@ -4954,7 +4954,7 @@
             <a:fld id="{807CB568-C05F-482F-9F26-AA302B8892DF}" type="datetimeFigureOut">
               <a:rPr lang="es-ES" smtClean="0"/>
               <a:pPr/>
-              <a:t>26/11/2013</a:t>
+              <a:t>11/12/2013</a:t>
             </a:fld>
             <a:endParaRPr lang="es-ES"/>
           </a:p>
@@ -7592,14 +7592,6 @@
               </a:rPr>
               <a:t>Legacy Code</a:t>
             </a:r>
-            <a:r>
-              <a:rPr lang="en-US" sz="11500" b="1" dirty="0" smtClean="0">
-                <a:solidFill>
-                  <a:srgbClr val="FF0000"/>
-                </a:solidFill>
-              </a:rPr>
-              <a:t/>
-            </a:r>
             <a:br>
               <a:rPr lang="en-US" sz="11500" b="1" dirty="0" smtClean="0">
                 <a:solidFill>
@@ -9083,135 +9075,6 @@
 </file>
 
 <file path=ppt/slides/slide5.xml><?xml version="1.0" encoding="utf-8"?>
-<p:sld xmlns:a="http://schemas.openxmlformats.org/drawingml/2006/main" xmlns:r="http://schemas.openxmlformats.org/officeDocument/2006/relationships" xmlns:p="http://schemas.openxmlformats.org/presentationml/2006/main">
-  <p:cSld>
-    <p:spTree>
-      <p:nvGrpSpPr>
-        <p:cNvPr id="1" name=""/>
-        <p:cNvGrpSpPr/>
-        <p:nvPr/>
-      </p:nvGrpSpPr>
-      <p:grpSpPr>
-        <a:xfrm>
-          <a:off x="0" y="0"/>
-          <a:ext cx="0" cy="0"/>
-          <a:chOff x="0" y="0"/>
-          <a:chExt cx="0" cy="0"/>
-        </a:xfrm>
-      </p:grpSpPr>
-      <p:sp>
-        <p:nvSpPr>
-          <p:cNvPr id="5" name="2 Título"/>
-          <p:cNvSpPr>
-            <a:spLocks noGrp="1"/>
-          </p:cNvSpPr>
-          <p:nvPr>
-            <p:ph type="title"/>
-          </p:nvPr>
-        </p:nvSpPr>
-        <p:spPr>
-          <a:xfrm>
-            <a:off x="179512" y="260648"/>
-            <a:ext cx="8712968" cy="844646"/>
-          </a:xfrm>
-        </p:spPr>
-        <p:txBody>
-          <a:bodyPr/>
-          <a:lstStyle/>
-          <a:p>
-            <a:r>
-              <a:rPr lang="es-PE" dirty="0" smtClean="0">
-                <a:solidFill>
-                  <a:srgbClr val="00823B"/>
-                </a:solidFill>
-              </a:rPr>
-              <a:t>Distribuir en Cada Sprint</a:t>
-            </a:r>
-            <a:endParaRPr lang="es-PE" dirty="0">
-              <a:solidFill>
-                <a:srgbClr val="00823B"/>
-              </a:solidFill>
-            </a:endParaRPr>
-          </a:p>
-        </p:txBody>
-      </p:sp>
-      <p:pic>
-        <p:nvPicPr>
-          <p:cNvPr id="4" name="Picture 2"/>
-          <p:cNvPicPr>
-            <a:picLocks noChangeAspect="1" noChangeArrowheads="1"/>
-          </p:cNvPicPr>
-          <p:nvPr/>
-        </p:nvPicPr>
-        <p:blipFill>
-          <a:blip r:embed="rId3">
-            <a:extLst>
-              <a:ext uri="{28A0092B-C50C-407E-A947-70E740481C1C}">
-                <a14:useLocalDpi xmlns:a14="http://schemas.microsoft.com/office/drawing/2010/main" val="0"/>
-              </a:ext>
-            </a:extLst>
-          </a:blip>
-          <a:srcRect/>
-          <a:stretch>
-            <a:fillRect/>
-          </a:stretch>
-        </p:blipFill>
-        <p:spPr bwMode="auto">
-          <a:xfrm>
-            <a:off x="1851281" y="1079292"/>
-            <a:ext cx="5441437" cy="5200886"/>
-          </a:xfrm>
-          <a:prstGeom prst="rect">
-            <a:avLst/>
-          </a:prstGeom>
-          <a:ln>
-            <a:noFill/>
-          </a:ln>
-          <a:effectLst>
-            <a:softEdge rad="112500"/>
-          </a:effectLst>
-          <a:extLst>
-            <a:ext uri="{909E8E84-426E-40DD-AFC4-6F175D3DCCD1}">
-              <a14:hiddenFill xmlns:a14="http://schemas.microsoft.com/office/drawing/2010/main">
-                <a:solidFill>
-                  <a:schemeClr val="accent1"/>
-                </a:solidFill>
-              </a14:hiddenFill>
-            </a:ext>
-            <a:ext uri="{91240B29-F687-4F45-9708-019B960494DF}">
-              <a14:hiddenLine xmlns:a14="http://schemas.microsoft.com/office/drawing/2010/main" w="9525">
-                <a:solidFill>
-                  <a:schemeClr val="tx1"/>
-                </a:solidFill>
-                <a:miter lim="800000"/>
-                <a:headEnd/>
-                <a:tailEnd/>
-              </a14:hiddenLine>
-            </a:ext>
-          </a:extLst>
-        </p:spPr>
-      </p:pic>
-    </p:spTree>
-    <p:extLst>
-      <p:ext uri="{BB962C8B-B14F-4D97-AF65-F5344CB8AC3E}">
-        <p14:creationId xmlns:p14="http://schemas.microsoft.com/office/powerpoint/2010/main" val="2301672281"/>
-      </p:ext>
-    </p:extLst>
-  </p:cSld>
-  <p:clrMapOvr>
-    <a:masterClrMapping/>
-  </p:clrMapOvr>
-  <p:timing>
-    <p:tnLst>
-      <p:par>
-        <p:cTn id="1" dur="indefinite" restart="never" nodeType="tmRoot"/>
-      </p:par>
-    </p:tnLst>
-  </p:timing>
-</p:sld>
-</file>
-
-<file path=ppt/slides/slide6.xml><?xml version="1.0" encoding="utf-8"?>
 <p:sld xmlns:a="http://schemas.openxmlformats.org/drawingml/2006/main" xmlns:r="http://schemas.openxmlformats.org/officeDocument/2006/relationships" xmlns:p="http://schemas.openxmlformats.org/presentationml/2006/main">
   <p:cSld>
     <p:spTree>
@@ -10206,6 +10069,135 @@
 </p:sld>
 </file>
 
+<file path=ppt/slides/slide6.xml><?xml version="1.0" encoding="utf-8"?>
+<p:sld xmlns:a="http://schemas.openxmlformats.org/drawingml/2006/main" xmlns:r="http://schemas.openxmlformats.org/officeDocument/2006/relationships" xmlns:p="http://schemas.openxmlformats.org/presentationml/2006/main">
+  <p:cSld>
+    <p:spTree>
+      <p:nvGrpSpPr>
+        <p:cNvPr id="1" name=""/>
+        <p:cNvGrpSpPr/>
+        <p:nvPr/>
+      </p:nvGrpSpPr>
+      <p:grpSpPr>
+        <a:xfrm>
+          <a:off x="0" y="0"/>
+          <a:ext cx="0" cy="0"/>
+          <a:chOff x="0" y="0"/>
+          <a:chExt cx="0" cy="0"/>
+        </a:xfrm>
+      </p:grpSpPr>
+      <p:sp>
+        <p:nvSpPr>
+          <p:cNvPr id="5" name="2 Título"/>
+          <p:cNvSpPr>
+            <a:spLocks noGrp="1"/>
+          </p:cNvSpPr>
+          <p:nvPr>
+            <p:ph type="title"/>
+          </p:nvPr>
+        </p:nvSpPr>
+        <p:spPr>
+          <a:xfrm>
+            <a:off x="179512" y="260648"/>
+            <a:ext cx="8712968" cy="844646"/>
+          </a:xfrm>
+        </p:spPr>
+        <p:txBody>
+          <a:bodyPr/>
+          <a:lstStyle/>
+          <a:p>
+            <a:r>
+              <a:rPr lang="es-PE" dirty="0" smtClean="0">
+                <a:solidFill>
+                  <a:srgbClr val="00823B"/>
+                </a:solidFill>
+              </a:rPr>
+              <a:t>Distribuir en Cada Sprint</a:t>
+            </a:r>
+            <a:endParaRPr lang="es-PE" dirty="0">
+              <a:solidFill>
+                <a:srgbClr val="00823B"/>
+              </a:solidFill>
+            </a:endParaRPr>
+          </a:p>
+        </p:txBody>
+      </p:sp>
+      <p:pic>
+        <p:nvPicPr>
+          <p:cNvPr id="4" name="Picture 2"/>
+          <p:cNvPicPr>
+            <a:picLocks noChangeAspect="1" noChangeArrowheads="1"/>
+          </p:cNvPicPr>
+          <p:nvPr/>
+        </p:nvPicPr>
+        <p:blipFill>
+          <a:blip r:embed="rId3">
+            <a:extLst>
+              <a:ext uri="{28A0092B-C50C-407E-A947-70E740481C1C}">
+                <a14:useLocalDpi xmlns:a14="http://schemas.microsoft.com/office/drawing/2010/main" val="0"/>
+              </a:ext>
+            </a:extLst>
+          </a:blip>
+          <a:srcRect/>
+          <a:stretch>
+            <a:fillRect/>
+          </a:stretch>
+        </p:blipFill>
+        <p:spPr bwMode="auto">
+          <a:xfrm>
+            <a:off x="1851281" y="1079292"/>
+            <a:ext cx="5441437" cy="5200886"/>
+          </a:xfrm>
+          <a:prstGeom prst="rect">
+            <a:avLst/>
+          </a:prstGeom>
+          <a:ln>
+            <a:noFill/>
+          </a:ln>
+          <a:effectLst>
+            <a:softEdge rad="112500"/>
+          </a:effectLst>
+          <a:extLst>
+            <a:ext uri="{909E8E84-426E-40DD-AFC4-6F175D3DCCD1}">
+              <a14:hiddenFill xmlns:a14="http://schemas.microsoft.com/office/drawing/2010/main">
+                <a:solidFill>
+                  <a:schemeClr val="accent1"/>
+                </a:solidFill>
+              </a14:hiddenFill>
+            </a:ext>
+            <a:ext uri="{91240B29-F687-4F45-9708-019B960494DF}">
+              <a14:hiddenLine xmlns:a14="http://schemas.microsoft.com/office/drawing/2010/main" w="9525">
+                <a:solidFill>
+                  <a:schemeClr val="tx1"/>
+                </a:solidFill>
+                <a:miter lim="800000"/>
+                <a:headEnd/>
+                <a:tailEnd/>
+              </a14:hiddenLine>
+            </a:ext>
+          </a:extLst>
+        </p:spPr>
+      </p:pic>
+    </p:spTree>
+    <p:extLst>
+      <p:ext uri="{BB962C8B-B14F-4D97-AF65-F5344CB8AC3E}">
+        <p14:creationId xmlns:p14="http://schemas.microsoft.com/office/powerpoint/2010/main" val="2301672281"/>
+      </p:ext>
+    </p:extLst>
+  </p:cSld>
+  <p:clrMapOvr>
+    <a:masterClrMapping/>
+  </p:clrMapOvr>
+  <p:timing>
+    <p:tnLst>
+      <p:par>
+        <p:cTn id="1" dur="indefinite" restart="never" nodeType="tmRoot"/>
+      </p:par>
+    </p:tnLst>
+  </p:timing>
+</p:sld>
+</file>
+
 <file path=ppt/slides/slide7.xml><?xml version="1.0" encoding="utf-8"?>
 <p:sld xmlns:a="http://schemas.openxmlformats.org/drawingml/2006/main" xmlns:r="http://schemas.openxmlformats.org/officeDocument/2006/relationships" xmlns:p="http://schemas.openxmlformats.org/presentationml/2006/main">
   <p:cSld>

</xml_diff>